<commit_message>
Ajustes en los ppt
</commit_message>
<xml_diff>
--- a/ppt/curso-devops-ulpgc-api.pptx
+++ b/ppt/curso-devops-ulpgc-api.pptx
@@ -5,10 +5,10 @@
     <p:sldMasterId id="2147483678" r:id="rId4"/>
   </p:sldMasterIdLst>
   <p:notesMasterIdLst>
-    <p:notesMasterId r:id="rId18"/>
+    <p:notesMasterId r:id="rId21"/>
   </p:notesMasterIdLst>
   <p:handoutMasterIdLst>
-    <p:handoutMasterId r:id="rId19"/>
+    <p:handoutMasterId r:id="rId22"/>
   </p:handoutMasterIdLst>
   <p:sldIdLst>
     <p:sldId id="302" r:id="rId5"/>
@@ -21,39 +21,42 @@
     <p:sldId id="1269" r:id="rId12"/>
     <p:sldId id="1270" r:id="rId13"/>
     <p:sldId id="1271" r:id="rId14"/>
-    <p:sldId id="1263" r:id="rId15"/>
-    <p:sldId id="304" r:id="rId16"/>
-    <p:sldId id="1255" r:id="rId17"/>
+    <p:sldId id="1272" r:id="rId15"/>
+    <p:sldId id="1273" r:id="rId16"/>
+    <p:sldId id="1274" r:id="rId17"/>
+    <p:sldId id="1263" r:id="rId18"/>
+    <p:sldId id="304" r:id="rId19"/>
+    <p:sldId id="1255" r:id="rId20"/>
   </p:sldIdLst>
   <p:sldSz cx="9144000" cy="5143500" type="screen16x9"/>
   <p:notesSz cx="6858000" cy="9144000"/>
   <p:embeddedFontLst>
     <p:embeddedFont>
       <p:font typeface="Arial Black" panose="020B0A04020102020204" pitchFamily="34" charset="0"/>
-      <p:bold r:id="rId20"/>
+      <p:bold r:id="rId23"/>
     </p:embeddedFont>
     <p:embeddedFont>
       <p:font typeface="Century Gothic" panose="020B0502020202020204" pitchFamily="34" charset="0"/>
-      <p:regular r:id="rId20"/>
-      <p:bold r:id="rId20"/>
-      <p:italic r:id="rId20"/>
-      <p:boldItalic r:id="rId20"/>
+      <p:regular r:id="rId23"/>
+      <p:bold r:id="rId23"/>
+      <p:italic r:id="rId23"/>
+      <p:boldItalic r:id="rId23"/>
     </p:embeddedFont>
     <p:embeddedFont>
       <p:font typeface="Montserrat" panose="00000500000000000000" pitchFamily="2" charset="0"/>
-      <p:regular r:id="rId21"/>
-      <p:bold r:id="rId22"/>
-      <p:italic r:id="rId23"/>
-      <p:boldItalic r:id="rId24"/>
+      <p:regular r:id="rId24"/>
+      <p:bold r:id="rId25"/>
+      <p:italic r:id="rId26"/>
+      <p:boldItalic r:id="rId27"/>
     </p:embeddedFont>
     <p:embeddedFont>
       <p:font typeface="Montserrat ExtraBold" panose="00000900000000000000" pitchFamily="2" charset="0"/>
-      <p:bold r:id="rId20"/>
-      <p:boldItalic r:id="rId20"/>
+      <p:bold r:id="rId23"/>
+      <p:boldItalic r:id="rId23"/>
     </p:embeddedFont>
     <p:embeddedFont>
       <p:font typeface="Ramabhadra"/>
-      <p:regular r:id="rId20"/>
+      <p:regular r:id="rId23"/>
     </p:embeddedFont>
   </p:embeddedFontLst>
   <p:defaultTextStyle>
@@ -409,7 +412,7 @@
           <a:p>
             <a:fld id="{4A3B785F-1BCE-1A46-9CAA-77ACC7103834}" type="datetimeFigureOut">
               <a:rPr lang="es-ES" smtClean="0"/>
-              <a:t>10/02/2023</a:t>
+              <a:t>13/02/2023</a:t>
             </a:fld>
             <a:endParaRPr lang="es-ES" dirty="0"/>
           </a:p>
@@ -1250,6 +1253,333 @@
               </a:spcAft>
               <a:buNone/>
             </a:pPr>
+            <a:endParaRPr dirty="0"/>
+          </a:p>
+        </p:txBody>
+      </p:sp>
+    </p:spTree>
+    <p:extLst>
+      <p:ext uri="{BB962C8B-B14F-4D97-AF65-F5344CB8AC3E}">
+        <p14:creationId xmlns:p14="http://schemas.microsoft.com/office/powerpoint/2010/main" val="2269035433"/>
+      </p:ext>
+    </p:extLst>
+  </p:cSld>
+  <p:clrMapOvr>
+    <a:masterClrMapping/>
+  </p:clrMapOvr>
+</p:notes>
+</file>
+
+<file path=ppt/notesSlides/notesSlide12.xml><?xml version="1.0" encoding="utf-8"?>
+<p:notes xmlns:a="http://schemas.openxmlformats.org/drawingml/2006/main" xmlns:r="http://schemas.openxmlformats.org/officeDocument/2006/relationships" xmlns:p="http://schemas.openxmlformats.org/presentationml/2006/main" showMasterSp="0" showMasterPhAnim="0">
+  <p:cSld>
+    <p:spTree>
+      <p:nvGrpSpPr>
+        <p:cNvPr id="1" name="Shape 350"/>
+        <p:cNvGrpSpPr/>
+        <p:nvPr/>
+      </p:nvGrpSpPr>
+      <p:grpSpPr>
+        <a:xfrm>
+          <a:off x="0" y="0"/>
+          <a:ext cx="0" cy="0"/>
+          <a:chOff x="0" y="0"/>
+          <a:chExt cx="0" cy="0"/>
+        </a:xfrm>
+      </p:grpSpPr>
+      <p:sp>
+        <p:nvSpPr>
+          <p:cNvPr id="351" name="Google Shape;351;gec13231a95_0_22:notes"/>
+          <p:cNvSpPr>
+            <a:spLocks noGrp="1" noRot="1" noChangeAspect="1"/>
+          </p:cNvSpPr>
+          <p:nvPr>
+            <p:ph type="sldImg" idx="2"/>
+          </p:nvPr>
+        </p:nvSpPr>
+        <p:spPr>
+          <a:xfrm>
+            <a:off x="381000" y="685800"/>
+            <a:ext cx="6096000" cy="3429000"/>
+          </a:xfrm>
+          <a:custGeom>
+            <a:avLst/>
+            <a:gdLst/>
+            <a:ahLst/>
+            <a:cxnLst/>
+            <a:rect l="l" t="t" r="r" b="b"/>
+            <a:pathLst>
+              <a:path w="120000" h="120000" extrusionOk="0">
+                <a:moveTo>
+                  <a:pt x="0" y="0"/>
+                </a:moveTo>
+                <a:lnTo>
+                  <a:pt x="120000" y="0"/>
+                </a:lnTo>
+                <a:lnTo>
+                  <a:pt x="120000" y="120000"/>
+                </a:lnTo>
+                <a:lnTo>
+                  <a:pt x="0" y="120000"/>
+                </a:lnTo>
+                <a:close/>
+              </a:path>
+            </a:pathLst>
+          </a:custGeom>
+        </p:spPr>
+      </p:sp>
+      <p:sp>
+        <p:nvSpPr>
+          <p:cNvPr id="352" name="Google Shape;352;gec13231a95_0_22:notes"/>
+          <p:cNvSpPr txBox="1">
+            <a:spLocks noGrp="1"/>
+          </p:cNvSpPr>
+          <p:nvPr>
+            <p:ph type="body" idx="1"/>
+          </p:nvPr>
+        </p:nvSpPr>
+        <p:spPr>
+          <a:xfrm>
+            <a:off x="685800" y="4343400"/>
+            <a:ext cx="5486400" cy="4114800"/>
+          </a:xfrm>
+          <a:prstGeom prst="rect">
+            <a:avLst/>
+          </a:prstGeom>
+        </p:spPr>
+        <p:txBody>
+          <a:bodyPr spcFirstLastPara="1" wrap="square" lIns="91425" tIns="91425" rIns="91425" bIns="91425" anchor="t" anchorCtr="0">
+            <a:noAutofit/>
+          </a:bodyPr>
+          <a:lstStyle/>
+          <a:p>
+            <a:pPr marL="0" lvl="0" indent="0" algn="l" rtl="0">
+              <a:spcBef>
+                <a:spcPts val="0"/>
+              </a:spcBef>
+              <a:spcAft>
+                <a:spcPts val="0"/>
+              </a:spcAft>
+              <a:buNone/>
+            </a:pPr>
+            <a:endParaRPr dirty="0"/>
+          </a:p>
+        </p:txBody>
+      </p:sp>
+    </p:spTree>
+    <p:extLst>
+      <p:ext uri="{BB962C8B-B14F-4D97-AF65-F5344CB8AC3E}">
+        <p14:creationId xmlns:p14="http://schemas.microsoft.com/office/powerpoint/2010/main" val="475150722"/>
+      </p:ext>
+    </p:extLst>
+  </p:cSld>
+  <p:clrMapOvr>
+    <a:masterClrMapping/>
+  </p:clrMapOvr>
+</p:notes>
+</file>
+
+<file path=ppt/notesSlides/notesSlide13.xml><?xml version="1.0" encoding="utf-8"?>
+<p:notes xmlns:a="http://schemas.openxmlformats.org/drawingml/2006/main" xmlns:r="http://schemas.openxmlformats.org/officeDocument/2006/relationships" xmlns:p="http://schemas.openxmlformats.org/presentationml/2006/main" showMasterSp="0" showMasterPhAnim="0">
+  <p:cSld>
+    <p:spTree>
+      <p:nvGrpSpPr>
+        <p:cNvPr id="1" name="Shape 350"/>
+        <p:cNvGrpSpPr/>
+        <p:nvPr/>
+      </p:nvGrpSpPr>
+      <p:grpSpPr>
+        <a:xfrm>
+          <a:off x="0" y="0"/>
+          <a:ext cx="0" cy="0"/>
+          <a:chOff x="0" y="0"/>
+          <a:chExt cx="0" cy="0"/>
+        </a:xfrm>
+      </p:grpSpPr>
+      <p:sp>
+        <p:nvSpPr>
+          <p:cNvPr id="351" name="Google Shape;351;gec13231a95_0_22:notes"/>
+          <p:cNvSpPr>
+            <a:spLocks noGrp="1" noRot="1" noChangeAspect="1"/>
+          </p:cNvSpPr>
+          <p:nvPr>
+            <p:ph type="sldImg" idx="2"/>
+          </p:nvPr>
+        </p:nvSpPr>
+        <p:spPr>
+          <a:xfrm>
+            <a:off x="381000" y="685800"/>
+            <a:ext cx="6096000" cy="3429000"/>
+          </a:xfrm>
+          <a:custGeom>
+            <a:avLst/>
+            <a:gdLst/>
+            <a:ahLst/>
+            <a:cxnLst/>
+            <a:rect l="l" t="t" r="r" b="b"/>
+            <a:pathLst>
+              <a:path w="120000" h="120000" extrusionOk="0">
+                <a:moveTo>
+                  <a:pt x="0" y="0"/>
+                </a:moveTo>
+                <a:lnTo>
+                  <a:pt x="120000" y="0"/>
+                </a:lnTo>
+                <a:lnTo>
+                  <a:pt x="120000" y="120000"/>
+                </a:lnTo>
+                <a:lnTo>
+                  <a:pt x="0" y="120000"/>
+                </a:lnTo>
+                <a:close/>
+              </a:path>
+            </a:pathLst>
+          </a:custGeom>
+        </p:spPr>
+      </p:sp>
+      <p:sp>
+        <p:nvSpPr>
+          <p:cNvPr id="352" name="Google Shape;352;gec13231a95_0_22:notes"/>
+          <p:cNvSpPr txBox="1">
+            <a:spLocks noGrp="1"/>
+          </p:cNvSpPr>
+          <p:nvPr>
+            <p:ph type="body" idx="1"/>
+          </p:nvPr>
+        </p:nvSpPr>
+        <p:spPr>
+          <a:xfrm>
+            <a:off x="685800" y="4343400"/>
+            <a:ext cx="5486400" cy="4114800"/>
+          </a:xfrm>
+          <a:prstGeom prst="rect">
+            <a:avLst/>
+          </a:prstGeom>
+        </p:spPr>
+        <p:txBody>
+          <a:bodyPr spcFirstLastPara="1" wrap="square" lIns="91425" tIns="91425" rIns="91425" bIns="91425" anchor="t" anchorCtr="0">
+            <a:noAutofit/>
+          </a:bodyPr>
+          <a:lstStyle/>
+          <a:p>
+            <a:pPr marL="0" lvl="0" indent="0" algn="l" rtl="0">
+              <a:spcBef>
+                <a:spcPts val="0"/>
+              </a:spcBef>
+              <a:spcAft>
+                <a:spcPts val="0"/>
+              </a:spcAft>
+              <a:buNone/>
+            </a:pPr>
+            <a:endParaRPr dirty="0"/>
+          </a:p>
+        </p:txBody>
+      </p:sp>
+    </p:spTree>
+    <p:extLst>
+      <p:ext uri="{BB962C8B-B14F-4D97-AF65-F5344CB8AC3E}">
+        <p14:creationId xmlns:p14="http://schemas.microsoft.com/office/powerpoint/2010/main" val="3166858941"/>
+      </p:ext>
+    </p:extLst>
+  </p:cSld>
+  <p:clrMapOvr>
+    <a:masterClrMapping/>
+  </p:clrMapOvr>
+</p:notes>
+</file>
+
+<file path=ppt/notesSlides/notesSlide14.xml><?xml version="1.0" encoding="utf-8"?>
+<p:notes xmlns:a="http://schemas.openxmlformats.org/drawingml/2006/main" xmlns:r="http://schemas.openxmlformats.org/officeDocument/2006/relationships" xmlns:p="http://schemas.openxmlformats.org/presentationml/2006/main" showMasterSp="0" showMasterPhAnim="0">
+  <p:cSld>
+    <p:spTree>
+      <p:nvGrpSpPr>
+        <p:cNvPr id="1" name="Shape 350"/>
+        <p:cNvGrpSpPr/>
+        <p:nvPr/>
+      </p:nvGrpSpPr>
+      <p:grpSpPr>
+        <a:xfrm>
+          <a:off x="0" y="0"/>
+          <a:ext cx="0" cy="0"/>
+          <a:chOff x="0" y="0"/>
+          <a:chExt cx="0" cy="0"/>
+        </a:xfrm>
+      </p:grpSpPr>
+      <p:sp>
+        <p:nvSpPr>
+          <p:cNvPr id="351" name="Google Shape;351;gec13231a95_0_22:notes"/>
+          <p:cNvSpPr>
+            <a:spLocks noGrp="1" noRot="1" noChangeAspect="1"/>
+          </p:cNvSpPr>
+          <p:nvPr>
+            <p:ph type="sldImg" idx="2"/>
+          </p:nvPr>
+        </p:nvSpPr>
+        <p:spPr>
+          <a:xfrm>
+            <a:off x="381000" y="685800"/>
+            <a:ext cx="6096000" cy="3429000"/>
+          </a:xfrm>
+          <a:custGeom>
+            <a:avLst/>
+            <a:gdLst/>
+            <a:ahLst/>
+            <a:cxnLst/>
+            <a:rect l="l" t="t" r="r" b="b"/>
+            <a:pathLst>
+              <a:path w="120000" h="120000" extrusionOk="0">
+                <a:moveTo>
+                  <a:pt x="0" y="0"/>
+                </a:moveTo>
+                <a:lnTo>
+                  <a:pt x="120000" y="0"/>
+                </a:lnTo>
+                <a:lnTo>
+                  <a:pt x="120000" y="120000"/>
+                </a:lnTo>
+                <a:lnTo>
+                  <a:pt x="0" y="120000"/>
+                </a:lnTo>
+                <a:close/>
+              </a:path>
+            </a:pathLst>
+          </a:custGeom>
+        </p:spPr>
+      </p:sp>
+      <p:sp>
+        <p:nvSpPr>
+          <p:cNvPr id="352" name="Google Shape;352;gec13231a95_0_22:notes"/>
+          <p:cNvSpPr txBox="1">
+            <a:spLocks noGrp="1"/>
+          </p:cNvSpPr>
+          <p:nvPr>
+            <p:ph type="body" idx="1"/>
+          </p:nvPr>
+        </p:nvSpPr>
+        <p:spPr>
+          <a:xfrm>
+            <a:off x="685800" y="4343400"/>
+            <a:ext cx="5486400" cy="4114800"/>
+          </a:xfrm>
+          <a:prstGeom prst="rect">
+            <a:avLst/>
+          </a:prstGeom>
+        </p:spPr>
+        <p:txBody>
+          <a:bodyPr spcFirstLastPara="1" wrap="square" lIns="91425" tIns="91425" rIns="91425" bIns="91425" anchor="t" anchorCtr="0">
+            <a:noAutofit/>
+          </a:bodyPr>
+          <a:lstStyle/>
+          <a:p>
+            <a:pPr marL="0" lvl="0" indent="0" algn="l" rtl="0">
+              <a:spcBef>
+                <a:spcPts val="0"/>
+              </a:spcBef>
+              <a:spcAft>
+                <a:spcPts val="0"/>
+              </a:spcAft>
+              <a:buNone/>
+            </a:pPr>
             <a:endParaRPr/>
           </a:p>
         </p:txBody>
@@ -1267,7 +1597,7 @@
 </p:notes>
 </file>
 
-<file path=ppt/notesSlides/notesSlide12.xml><?xml version="1.0" encoding="utf-8"?>
+<file path=ppt/notesSlides/notesSlide15.xml><?xml version="1.0" encoding="utf-8"?>
 <p:notes xmlns:a="http://schemas.openxmlformats.org/drawingml/2006/main" xmlns:r="http://schemas.openxmlformats.org/officeDocument/2006/relationships" xmlns:p="http://schemas.openxmlformats.org/presentationml/2006/main" showMasterSp="0" showMasterPhAnim="0">
   <p:cSld>
     <p:spTree>
@@ -1371,7 +1701,7 @@
 </p:notes>
 </file>
 
-<file path=ppt/notesSlides/notesSlide13.xml><?xml version="1.0" encoding="utf-8"?>
+<file path=ppt/notesSlides/notesSlide16.xml><?xml version="1.0" encoding="utf-8"?>
 <p:notes xmlns:a="http://schemas.openxmlformats.org/drawingml/2006/main" xmlns:r="http://schemas.openxmlformats.org/officeDocument/2006/relationships" xmlns:p="http://schemas.openxmlformats.org/presentationml/2006/main" showMasterSp="0" showMasterPhAnim="0">
   <p:cSld>
     <p:spTree>
@@ -10260,6 +10590,355 @@
           <a:chExt cx="0" cy="0"/>
         </a:xfrm>
       </p:grpSpPr>
+      <p:pic>
+        <p:nvPicPr>
+          <p:cNvPr id="4" name="Imagen 3">
+            <a:extLst>
+              <a:ext uri="{FF2B5EF4-FFF2-40B4-BE49-F238E27FC236}">
+                <a16:creationId xmlns:a16="http://schemas.microsoft.com/office/drawing/2014/main" id="{DD3EA722-A4F2-8A1B-1991-B0CF2F9D1CB3}"/>
+              </a:ext>
+            </a:extLst>
+          </p:cNvPr>
+          <p:cNvPicPr>
+            <a:picLocks noChangeAspect="1"/>
+          </p:cNvPicPr>
+          <p:nvPr/>
+        </p:nvPicPr>
+        <p:blipFill>
+          <a:blip r:embed="rId3"/>
+          <a:stretch>
+            <a:fillRect/>
+          </a:stretch>
+        </p:blipFill>
+        <p:spPr>
+          <a:xfrm>
+            <a:off x="613386" y="740013"/>
+            <a:ext cx="7494107" cy="4156741"/>
+          </a:xfrm>
+          <a:prstGeom prst="rect">
+            <a:avLst/>
+          </a:prstGeom>
+        </p:spPr>
+      </p:pic>
+      <p:sp>
+        <p:nvSpPr>
+          <p:cNvPr id="354" name="Google Shape;354;p37"/>
+          <p:cNvSpPr txBox="1">
+            <a:spLocks noGrp="1"/>
+          </p:cNvSpPr>
+          <p:nvPr>
+            <p:ph type="title"/>
+          </p:nvPr>
+        </p:nvSpPr>
+        <p:spPr>
+          <a:xfrm>
+            <a:off x="714375" y="190941"/>
+            <a:ext cx="7715250" cy="571500"/>
+          </a:xfrm>
+          <a:prstGeom prst="rect">
+            <a:avLst/>
+          </a:prstGeom>
+        </p:spPr>
+        <p:txBody>
+          <a:bodyPr spcFirstLastPara="1" wrap="square" lIns="91425" tIns="91425" rIns="91425" bIns="91425" anchor="t" anchorCtr="0">
+            <a:noAutofit/>
+          </a:bodyPr>
+          <a:lstStyle/>
+          <a:p>
+            <a:pPr lvl="0" algn="ctr"/>
+            <a:r>
+              <a:rPr lang="es-ES" dirty="0">
+                <a:latin typeface="Century Gothic" panose="020B0502020202020204" pitchFamily="34" charset="0"/>
+              </a:rPr>
+              <a:t>MAVEN</a:t>
+            </a:r>
+            <a:endParaRPr dirty="0">
+              <a:solidFill>
+                <a:schemeClr val="accent3"/>
+              </a:solidFill>
+              <a:latin typeface="Century Gothic" panose="020B0502020202020204" pitchFamily="34" charset="0"/>
+            </a:endParaRPr>
+          </a:p>
+        </p:txBody>
+      </p:sp>
+      <p:pic>
+        <p:nvPicPr>
+          <p:cNvPr id="3078" name="Picture 6">
+            <a:extLst>
+              <a:ext uri="{FF2B5EF4-FFF2-40B4-BE49-F238E27FC236}">
+                <a16:creationId xmlns:a16="http://schemas.microsoft.com/office/drawing/2014/main" id="{852C7473-011A-5322-4419-6F6DE03BF6C9}"/>
+              </a:ext>
+            </a:extLst>
+          </p:cNvPr>
+          <p:cNvPicPr>
+            <a:picLocks noChangeAspect="1" noChangeArrowheads="1"/>
+          </p:cNvPicPr>
+          <p:nvPr/>
+        </p:nvPicPr>
+        <p:blipFill>
+          <a:blip r:embed="rId4">
+            <a:extLst>
+              <a:ext uri="{28A0092B-C50C-407E-A947-70E740481C1C}">
+                <a14:useLocalDpi xmlns:a14="http://schemas.microsoft.com/office/drawing/2010/main" val="0"/>
+              </a:ext>
+            </a:extLst>
+          </a:blip>
+          <a:srcRect/>
+          <a:stretch>
+            <a:fillRect/>
+          </a:stretch>
+        </p:blipFill>
+        <p:spPr bwMode="auto">
+          <a:xfrm>
+            <a:off x="7402995" y="4694405"/>
+            <a:ext cx="1706321" cy="431352"/>
+          </a:xfrm>
+          <a:prstGeom prst="rect">
+            <a:avLst/>
+          </a:prstGeom>
+          <a:noFill/>
+          <a:extLst>
+            <a:ext uri="{909E8E84-426E-40DD-AFC4-6F175D3DCCD1}">
+              <a14:hiddenFill xmlns:a14="http://schemas.microsoft.com/office/drawing/2010/main">
+                <a:solidFill>
+                  <a:srgbClr val="FFFFFF"/>
+                </a:solidFill>
+              </a14:hiddenFill>
+            </a:ext>
+          </a:extLst>
+        </p:spPr>
+      </p:pic>
+    </p:spTree>
+    <p:extLst>
+      <p:ext uri="{BB962C8B-B14F-4D97-AF65-F5344CB8AC3E}">
+        <p14:creationId xmlns:p14="http://schemas.microsoft.com/office/powerpoint/2010/main" val="4184564884"/>
+      </p:ext>
+    </p:extLst>
+  </p:cSld>
+  <p:clrMapOvr>
+    <a:masterClrMapping/>
+  </p:clrMapOvr>
+</p:sld>
+</file>
+
+<file path=ppt/slides/slide12.xml><?xml version="1.0" encoding="utf-8"?>
+<p:sld xmlns:a="http://schemas.openxmlformats.org/drawingml/2006/main" xmlns:r="http://schemas.openxmlformats.org/officeDocument/2006/relationships" xmlns:p="http://schemas.openxmlformats.org/presentationml/2006/main">
+  <p:cSld>
+    <p:spTree>
+      <p:nvGrpSpPr>
+        <p:cNvPr id="1" name="Shape 353"/>
+        <p:cNvGrpSpPr/>
+        <p:nvPr/>
+      </p:nvGrpSpPr>
+      <p:grpSpPr>
+        <a:xfrm>
+          <a:off x="0" y="0"/>
+          <a:ext cx="0" cy="0"/>
+          <a:chOff x="0" y="0"/>
+          <a:chExt cx="0" cy="0"/>
+        </a:xfrm>
+      </p:grpSpPr>
+      <p:sp>
+        <p:nvSpPr>
+          <p:cNvPr id="354" name="Google Shape;354;p37"/>
+          <p:cNvSpPr txBox="1">
+            <a:spLocks noGrp="1"/>
+          </p:cNvSpPr>
+          <p:nvPr>
+            <p:ph type="title"/>
+          </p:nvPr>
+        </p:nvSpPr>
+        <p:spPr>
+          <a:xfrm>
+            <a:off x="714375" y="-2167"/>
+            <a:ext cx="7715250" cy="571500"/>
+          </a:xfrm>
+          <a:prstGeom prst="rect">
+            <a:avLst/>
+          </a:prstGeom>
+        </p:spPr>
+        <p:txBody>
+          <a:bodyPr spcFirstLastPara="1" wrap="square" lIns="91425" tIns="91425" rIns="91425" bIns="91425" anchor="t" anchorCtr="0">
+            <a:noAutofit/>
+          </a:bodyPr>
+          <a:lstStyle/>
+          <a:p>
+            <a:pPr lvl="0" algn="ctr"/>
+            <a:r>
+              <a:rPr lang="es-ES" dirty="0">
+                <a:latin typeface="Century Gothic" panose="020B0502020202020204" pitchFamily="34" charset="0"/>
+              </a:rPr>
+              <a:t>API</a:t>
+            </a:r>
+            <a:endParaRPr dirty="0">
+              <a:solidFill>
+                <a:schemeClr val="accent3"/>
+              </a:solidFill>
+              <a:latin typeface="Century Gothic" panose="020B0502020202020204" pitchFamily="34" charset="0"/>
+            </a:endParaRPr>
+          </a:p>
+        </p:txBody>
+      </p:sp>
+      <p:pic>
+        <p:nvPicPr>
+          <p:cNvPr id="3" name="Imagen 2">
+            <a:extLst>
+              <a:ext uri="{FF2B5EF4-FFF2-40B4-BE49-F238E27FC236}">
+                <a16:creationId xmlns:a16="http://schemas.microsoft.com/office/drawing/2014/main" id="{79FD624B-B0E9-1893-6890-9BA8D1C6608C}"/>
+              </a:ext>
+            </a:extLst>
+          </p:cNvPr>
+          <p:cNvPicPr>
+            <a:picLocks noChangeAspect="1"/>
+          </p:cNvPicPr>
+          <p:nvPr/>
+        </p:nvPicPr>
+        <p:blipFill rotWithShape="1">
+          <a:blip r:embed="rId3"/>
+          <a:srcRect t="1188"/>
+          <a:stretch/>
+        </p:blipFill>
+        <p:spPr>
+          <a:xfrm>
+            <a:off x="0" y="569333"/>
+            <a:ext cx="9144000" cy="4271982"/>
+          </a:xfrm>
+          <a:prstGeom prst="rect">
+            <a:avLst/>
+          </a:prstGeom>
+        </p:spPr>
+      </p:pic>
+    </p:spTree>
+    <p:extLst>
+      <p:ext uri="{BB962C8B-B14F-4D97-AF65-F5344CB8AC3E}">
+        <p14:creationId xmlns:p14="http://schemas.microsoft.com/office/powerpoint/2010/main" val="2289645106"/>
+      </p:ext>
+    </p:extLst>
+  </p:cSld>
+  <p:clrMapOvr>
+    <a:masterClrMapping/>
+  </p:clrMapOvr>
+</p:sld>
+</file>
+
+<file path=ppt/slides/slide13.xml><?xml version="1.0" encoding="utf-8"?>
+<p:sld xmlns:a="http://schemas.openxmlformats.org/drawingml/2006/main" xmlns:r="http://schemas.openxmlformats.org/officeDocument/2006/relationships" xmlns:p="http://schemas.openxmlformats.org/presentationml/2006/main">
+  <p:cSld>
+    <p:spTree>
+      <p:nvGrpSpPr>
+        <p:cNvPr id="1" name="Shape 353"/>
+        <p:cNvGrpSpPr/>
+        <p:nvPr/>
+      </p:nvGrpSpPr>
+      <p:grpSpPr>
+        <a:xfrm>
+          <a:off x="0" y="0"/>
+          <a:ext cx="0" cy="0"/>
+          <a:chOff x="0" y="0"/>
+          <a:chExt cx="0" cy="0"/>
+        </a:xfrm>
+      </p:grpSpPr>
+      <p:sp>
+        <p:nvSpPr>
+          <p:cNvPr id="354" name="Google Shape;354;p37"/>
+          <p:cNvSpPr txBox="1">
+            <a:spLocks noGrp="1"/>
+          </p:cNvSpPr>
+          <p:nvPr>
+            <p:ph type="title"/>
+          </p:nvPr>
+        </p:nvSpPr>
+        <p:spPr>
+          <a:xfrm>
+            <a:off x="714375" y="-2167"/>
+            <a:ext cx="7715250" cy="571500"/>
+          </a:xfrm>
+          <a:prstGeom prst="rect">
+            <a:avLst/>
+          </a:prstGeom>
+        </p:spPr>
+        <p:txBody>
+          <a:bodyPr spcFirstLastPara="1" wrap="square" lIns="91425" tIns="91425" rIns="91425" bIns="91425" anchor="t" anchorCtr="0">
+            <a:noAutofit/>
+          </a:bodyPr>
+          <a:lstStyle/>
+          <a:p>
+            <a:pPr lvl="0" algn="ctr"/>
+            <a:r>
+              <a:rPr lang="es-ES" dirty="0">
+                <a:latin typeface="Century Gothic" panose="020B0502020202020204" pitchFamily="34" charset="0"/>
+              </a:rPr>
+              <a:t>API</a:t>
+            </a:r>
+            <a:endParaRPr dirty="0">
+              <a:solidFill>
+                <a:schemeClr val="accent3"/>
+              </a:solidFill>
+              <a:latin typeface="Century Gothic" panose="020B0502020202020204" pitchFamily="34" charset="0"/>
+            </a:endParaRPr>
+          </a:p>
+        </p:txBody>
+      </p:sp>
+      <p:pic>
+        <p:nvPicPr>
+          <p:cNvPr id="4" name="Imagen 3">
+            <a:extLst>
+              <a:ext uri="{FF2B5EF4-FFF2-40B4-BE49-F238E27FC236}">
+                <a16:creationId xmlns:a16="http://schemas.microsoft.com/office/drawing/2014/main" id="{F085EFA9-0255-C7F3-3493-55471BB12EC8}"/>
+              </a:ext>
+            </a:extLst>
+          </p:cNvPr>
+          <p:cNvPicPr>
+            <a:picLocks noChangeAspect="1"/>
+          </p:cNvPicPr>
+          <p:nvPr/>
+        </p:nvPicPr>
+        <p:blipFill>
+          <a:blip r:embed="rId3"/>
+          <a:stretch>
+            <a:fillRect/>
+          </a:stretch>
+        </p:blipFill>
+        <p:spPr>
+          <a:xfrm>
+            <a:off x="374847" y="569333"/>
+            <a:ext cx="8144407" cy="4255462"/>
+          </a:xfrm>
+          <a:prstGeom prst="rect">
+            <a:avLst/>
+          </a:prstGeom>
+        </p:spPr>
+      </p:pic>
+    </p:spTree>
+    <p:extLst>
+      <p:ext uri="{BB962C8B-B14F-4D97-AF65-F5344CB8AC3E}">
+        <p14:creationId xmlns:p14="http://schemas.microsoft.com/office/powerpoint/2010/main" val="4229209639"/>
+      </p:ext>
+    </p:extLst>
+  </p:cSld>
+  <p:clrMapOvr>
+    <a:masterClrMapping/>
+  </p:clrMapOvr>
+</p:sld>
+</file>
+
+<file path=ppt/slides/slide14.xml><?xml version="1.0" encoding="utf-8"?>
+<p:sld xmlns:a="http://schemas.openxmlformats.org/drawingml/2006/main" xmlns:r="http://schemas.openxmlformats.org/officeDocument/2006/relationships" xmlns:p="http://schemas.openxmlformats.org/presentationml/2006/main">
+  <p:cSld>
+    <p:spTree>
+      <p:nvGrpSpPr>
+        <p:cNvPr id="1" name="Shape 353"/>
+        <p:cNvGrpSpPr/>
+        <p:nvPr/>
+      </p:nvGrpSpPr>
+      <p:grpSpPr>
+        <a:xfrm>
+          <a:off x="0" y="0"/>
+          <a:ext cx="0" cy="0"/>
+          <a:chOff x="0" y="0"/>
+          <a:chExt cx="0" cy="0"/>
+        </a:xfrm>
+      </p:grpSpPr>
       <p:sp>
         <p:nvSpPr>
           <p:cNvPr id="354" name="Google Shape;354;p37"/>
@@ -10839,7 +11518,7 @@
 </p:sld>
 </file>
 
-<file path=ppt/slides/slide12.xml><?xml version="1.0" encoding="utf-8"?>
+<file path=ppt/slides/slide15.xml><?xml version="1.0" encoding="utf-8"?>
 <p:sld xmlns:a="http://schemas.openxmlformats.org/drawingml/2006/main" xmlns:r="http://schemas.openxmlformats.org/officeDocument/2006/relationships" xmlns:p="http://schemas.openxmlformats.org/presentationml/2006/main">
   <p:cSld>
     <p:spTree>
@@ -11978,7 +12657,7 @@
 </p:sld>
 </file>
 
-<file path=ppt/slides/slide13.xml><?xml version="1.0" encoding="utf-8"?>
+<file path=ppt/slides/slide16.xml><?xml version="1.0" encoding="utf-8"?>
 <p:sld xmlns:a="http://schemas.openxmlformats.org/drawingml/2006/main" xmlns:r="http://schemas.openxmlformats.org/officeDocument/2006/relationships" xmlns:p="http://schemas.openxmlformats.org/presentationml/2006/main">
   <p:cSld>
     <p:spTree>
@@ -22335,15 +23014,6 @@
 </file>
 
 <file path=customXml/item2.xml><?xml version="1.0" encoding="utf-8"?>
-<?mso-contentType ?>
-<FormTemplates xmlns="http://schemas.microsoft.com/sharepoint/v3/contenttype/forms">
-  <Display>DocumentLibraryForm</Display>
-  <Edit>DocumentLibraryForm</Edit>
-  <New>DocumentLibraryForm</New>
-</FormTemplates>
-</file>
-
-<file path=customXml/item3.xml><?xml version="1.0" encoding="utf-8"?>
 <ct:contentTypeSchema xmlns:ct="http://schemas.microsoft.com/office/2006/metadata/contentType" xmlns:ma="http://schemas.microsoft.com/office/2006/metadata/properties/metaAttributes" ct:_="" ma:_="" ma:contentTypeName="Documento" ma:contentTypeID="0x0101006B1E11B541137C48AA3727DCBBA54C16" ma:contentTypeVersion="11" ma:contentTypeDescription="Crear nuevo documento." ma:contentTypeScope="" ma:versionID="95949c5f839407ce12e4e96351584624">
   <xsd:schema xmlns:xsd="http://www.w3.org/2001/XMLSchema" xmlns:xs="http://www.w3.org/2001/XMLSchema" xmlns:p="http://schemas.microsoft.com/office/2006/metadata/properties" xmlns:ns2="e202ecef-a3f6-4d98-ad9b-1b77cdb87b84" xmlns:ns3="435026e9-b5d0-4467-bbd9-3b76a09ae0c4" targetNamespace="http://schemas.microsoft.com/office/2006/metadata/properties" ma:root="true" ma:fieldsID="f348301bcb62330657a04a353e23fd75" ns2:_="" ns3:_="">
     <xsd:import namespace="e202ecef-a3f6-4d98-ad9b-1b77cdb87b84"/>
@@ -22538,6 +23208,15 @@
 </ct:contentTypeSchema>
 </file>
 
+<file path=customXml/item3.xml><?xml version="1.0" encoding="utf-8"?>
+<?mso-contentType ?>
+<FormTemplates xmlns="http://schemas.microsoft.com/sharepoint/v3/contenttype/forms">
+  <Display>DocumentLibraryForm</Display>
+  <Edit>DocumentLibraryForm</Edit>
+  <New>DocumentLibraryForm</New>
+</FormTemplates>
+</file>
+
 <file path=customXml/itemProps1.xml><?xml version="1.0" encoding="utf-8"?>
 <ds:datastoreItem xmlns:ds="http://schemas.openxmlformats.org/officeDocument/2006/customXml" ds:itemID="{2F6D6B62-92C6-4EDE-B50E-8B81CFF669EA}">
   <ds:schemaRefs>
@@ -22550,14 +23229,6 @@
 </file>
 
 <file path=customXml/itemProps2.xml><?xml version="1.0" encoding="utf-8"?>
-<ds:datastoreItem xmlns:ds="http://schemas.openxmlformats.org/officeDocument/2006/customXml" ds:itemID="{A4B54BEA-998E-408D-BCCD-09BA67DF44CE}">
-  <ds:schemaRefs>
-    <ds:schemaRef ds:uri="http://schemas.microsoft.com/sharepoint/v3/contenttype/forms"/>
-  </ds:schemaRefs>
-</ds:datastoreItem>
-</file>
-
-<file path=customXml/itemProps3.xml><?xml version="1.0" encoding="utf-8"?>
 <ds:datastoreItem xmlns:ds="http://schemas.openxmlformats.org/officeDocument/2006/customXml" ds:itemID="{592DADBC-4920-4373-95D3-1A0ABF3667A7}">
   <ds:schemaRefs>
     <ds:schemaRef ds:uri="http://schemas.microsoft.com/office/2006/metadata/contentType"/>
@@ -22574,4 +23245,12 @@
     <ds:schemaRef ds:uri="http://schemas.microsoft.com/internal/obd"/>
   </ds:schemaRefs>
 </ds:datastoreItem>
+</file>
+
+<file path=customXml/itemProps3.xml><?xml version="1.0" encoding="utf-8"?>
+<ds:datastoreItem xmlns:ds="http://schemas.openxmlformats.org/officeDocument/2006/customXml" ds:itemID="{A4B54BEA-998E-408D-BCCD-09BA67DF44CE}">
+  <ds:schemaRefs>
+    <ds:schemaRef ds:uri="http://schemas.microsoft.com/sharepoint/v3/contenttype/forms"/>
+  </ds:schemaRefs>
+</ds:datastoreItem>
 </file>
</xml_diff>